<commit_message>
Aula Alg de Ord 03Set2025 ...
</commit_message>
<xml_diff>
--- a/01 Classes/Aula 04 - Algoritmos e Complexidade - Algoritmos de Ordenação.pptx
+++ b/01 Classes/Aula 04 - Algoritmos e Complexidade - Algoritmos de Ordenação.pptx
@@ -21,10 +21,10 @@
     <p:sldId id="350" r:id="rId12"/>
     <p:sldId id="341" r:id="rId13"/>
     <p:sldId id="351" r:id="rId14"/>
-    <p:sldId id="343" r:id="rId15"/>
-    <p:sldId id="354" r:id="rId16"/>
-    <p:sldId id="352" r:id="rId17"/>
-    <p:sldId id="355" r:id="rId18"/>
+    <p:sldId id="352" r:id="rId15"/>
+    <p:sldId id="355" r:id="rId16"/>
+    <p:sldId id="343" r:id="rId17"/>
+    <p:sldId id="354" r:id="rId18"/>
     <p:sldId id="353" r:id="rId19"/>
     <p:sldId id="356" r:id="rId20"/>
     <p:sldId id="357" r:id="rId21"/>
@@ -854,6 +854,174 @@
         <p:cNvPr id="1" name="">
           <a:extLst>
             <a:ext uri="{FF2B5EF4-FFF2-40B4-BE49-F238E27FC236}">
+              <a16:creationId xmlns:a16="http://schemas.microsoft.com/office/drawing/2014/main" id="{EA2D2526-76BF-1058-C793-0D01A39B57B5}"/>
+            </a:ext>
+          </a:extLst>
+        </p:cNvPr>
+        <p:cNvGrpSpPr/>
+        <p:nvPr/>
+      </p:nvGrpSpPr>
+      <p:grpSpPr>
+        <a:xfrm>
+          <a:off x="0" y="0"/>
+          <a:ext cx="0" cy="0"/>
+          <a:chOff x="0" y="0"/>
+          <a:chExt cx="0" cy="0"/>
+        </a:xfrm>
+      </p:grpSpPr>
+      <p:sp>
+        <p:nvSpPr>
+          <p:cNvPr id="2" name="Espaço Reservado para Imagem de Slide 1">
+            <a:extLst>
+              <a:ext uri="{FF2B5EF4-FFF2-40B4-BE49-F238E27FC236}">
+                <a16:creationId xmlns:a16="http://schemas.microsoft.com/office/drawing/2014/main" id="{172F1D6D-7876-BD59-85C1-CE4F93A3A4E0}"/>
+              </a:ext>
+            </a:extLst>
+          </p:cNvPr>
+          <p:cNvSpPr>
+            <a:spLocks noGrp="1" noRot="1" noChangeAspect="1"/>
+          </p:cNvSpPr>
+          <p:nvPr>
+            <p:ph type="sldImg"/>
+          </p:nvPr>
+        </p:nvSpPr>
+        <p:spPr>
+          <a:xfrm>
+            <a:off x="381000" y="685800"/>
+            <a:ext cx="6096000" cy="3429000"/>
+          </a:xfrm>
+        </p:spPr>
+      </p:sp>
+      <p:sp>
+        <p:nvSpPr>
+          <p:cNvPr id="3" name="Espaço Reservado para Anotações 2">
+            <a:extLst>
+              <a:ext uri="{FF2B5EF4-FFF2-40B4-BE49-F238E27FC236}">
+                <a16:creationId xmlns:a16="http://schemas.microsoft.com/office/drawing/2014/main" id="{4154DC03-8F4F-F5F9-14A6-5A6D30D64D38}"/>
+              </a:ext>
+            </a:extLst>
+          </p:cNvPr>
+          <p:cNvSpPr>
+            <a:spLocks noGrp="1"/>
+          </p:cNvSpPr>
+          <p:nvPr>
+            <p:ph type="body" idx="1"/>
+          </p:nvPr>
+        </p:nvSpPr>
+        <p:spPr/>
+        <p:txBody>
+          <a:bodyPr/>
+          <a:lstStyle/>
+          <a:p>
+            <a:endParaRPr lang="pt-BR" dirty="0"/>
+          </a:p>
+        </p:txBody>
+      </p:sp>
+    </p:spTree>
+    <p:extLst>
+      <p:ext uri="{BB962C8B-B14F-4D97-AF65-F5344CB8AC3E}">
+        <p14:creationId xmlns:p14="http://schemas.microsoft.com/office/powerpoint/2010/main" val="3302927879"/>
+      </p:ext>
+    </p:extLst>
+  </p:cSld>
+  <p:clrMapOvr>
+    <a:masterClrMapping/>
+  </p:clrMapOvr>
+</p:notes>
+</file>
+
+<file path=ppt/notesSlides/notesSlide14.xml><?xml version="1.0" encoding="utf-8"?>
+<p:notes xmlns:a="http://schemas.openxmlformats.org/drawingml/2006/main" xmlns:r="http://schemas.openxmlformats.org/officeDocument/2006/relationships" xmlns:p="http://schemas.openxmlformats.org/presentationml/2006/main">
+  <p:cSld>
+    <p:spTree>
+      <p:nvGrpSpPr>
+        <p:cNvPr id="1" name="">
+          <a:extLst>
+            <a:ext uri="{FF2B5EF4-FFF2-40B4-BE49-F238E27FC236}">
+              <a16:creationId xmlns:a16="http://schemas.microsoft.com/office/drawing/2014/main" id="{9FF4D68A-1501-0D24-0905-8A003CF8EFC0}"/>
+            </a:ext>
+          </a:extLst>
+        </p:cNvPr>
+        <p:cNvGrpSpPr/>
+        <p:nvPr/>
+      </p:nvGrpSpPr>
+      <p:grpSpPr>
+        <a:xfrm>
+          <a:off x="0" y="0"/>
+          <a:ext cx="0" cy="0"/>
+          <a:chOff x="0" y="0"/>
+          <a:chExt cx="0" cy="0"/>
+        </a:xfrm>
+      </p:grpSpPr>
+      <p:sp>
+        <p:nvSpPr>
+          <p:cNvPr id="2" name="Espaço Reservado para Imagem de Slide 1">
+            <a:extLst>
+              <a:ext uri="{FF2B5EF4-FFF2-40B4-BE49-F238E27FC236}">
+                <a16:creationId xmlns:a16="http://schemas.microsoft.com/office/drawing/2014/main" id="{D37D9626-F199-322F-F480-2F0DF85EA67A}"/>
+              </a:ext>
+            </a:extLst>
+          </p:cNvPr>
+          <p:cNvSpPr>
+            <a:spLocks noGrp="1" noRot="1" noChangeAspect="1"/>
+          </p:cNvSpPr>
+          <p:nvPr>
+            <p:ph type="sldImg"/>
+          </p:nvPr>
+        </p:nvSpPr>
+        <p:spPr>
+          <a:xfrm>
+            <a:off x="381000" y="685800"/>
+            <a:ext cx="6096000" cy="3429000"/>
+          </a:xfrm>
+        </p:spPr>
+      </p:sp>
+      <p:sp>
+        <p:nvSpPr>
+          <p:cNvPr id="3" name="Espaço Reservado para Anotações 2">
+            <a:extLst>
+              <a:ext uri="{FF2B5EF4-FFF2-40B4-BE49-F238E27FC236}">
+                <a16:creationId xmlns:a16="http://schemas.microsoft.com/office/drawing/2014/main" id="{4BD7A2F5-2044-D054-8CA5-F4DC5FF41A51}"/>
+              </a:ext>
+            </a:extLst>
+          </p:cNvPr>
+          <p:cNvSpPr>
+            <a:spLocks noGrp="1"/>
+          </p:cNvSpPr>
+          <p:nvPr>
+            <p:ph type="body" idx="1"/>
+          </p:nvPr>
+        </p:nvSpPr>
+        <p:spPr/>
+        <p:txBody>
+          <a:bodyPr/>
+          <a:lstStyle/>
+          <a:p>
+            <a:endParaRPr lang="pt-BR" dirty="0"/>
+          </a:p>
+        </p:txBody>
+      </p:sp>
+    </p:spTree>
+    <p:extLst>
+      <p:ext uri="{BB962C8B-B14F-4D97-AF65-F5344CB8AC3E}">
+        <p14:creationId xmlns:p14="http://schemas.microsoft.com/office/powerpoint/2010/main" val="4160211408"/>
+      </p:ext>
+    </p:extLst>
+  </p:cSld>
+  <p:clrMapOvr>
+    <a:masterClrMapping/>
+  </p:clrMapOvr>
+</p:notes>
+</file>
+
+<file path=ppt/notesSlides/notesSlide15.xml><?xml version="1.0" encoding="utf-8"?>
+<p:notes xmlns:a="http://schemas.openxmlformats.org/drawingml/2006/main" xmlns:r="http://schemas.openxmlformats.org/officeDocument/2006/relationships" xmlns:p="http://schemas.openxmlformats.org/presentationml/2006/main">
+  <p:cSld>
+    <p:spTree>
+      <p:nvGrpSpPr>
+        <p:cNvPr id="1" name="">
+          <a:extLst>
+            <a:ext uri="{FF2B5EF4-FFF2-40B4-BE49-F238E27FC236}">
               <a16:creationId xmlns:a16="http://schemas.microsoft.com/office/drawing/2014/main" id="{D5EEA32A-D2D6-D26B-BFA2-A3FC60D5166D}"/>
             </a:ext>
           </a:extLst>
@@ -930,7 +1098,7 @@
 </p:notes>
 </file>
 
-<file path=ppt/notesSlides/notesSlide14.xml><?xml version="1.0" encoding="utf-8"?>
+<file path=ppt/notesSlides/notesSlide16.xml><?xml version="1.0" encoding="utf-8"?>
 <p:notes xmlns:a="http://schemas.openxmlformats.org/drawingml/2006/main" xmlns:r="http://schemas.openxmlformats.org/officeDocument/2006/relationships" xmlns:p="http://schemas.openxmlformats.org/presentationml/2006/main">
   <p:cSld>
     <p:spTree>
@@ -1005,174 +1173,6 @@
     <p:extLst>
       <p:ext uri="{BB962C8B-B14F-4D97-AF65-F5344CB8AC3E}">
         <p14:creationId xmlns:p14="http://schemas.microsoft.com/office/powerpoint/2010/main" val="3187246669"/>
-      </p:ext>
-    </p:extLst>
-  </p:cSld>
-  <p:clrMapOvr>
-    <a:masterClrMapping/>
-  </p:clrMapOvr>
-</p:notes>
-</file>
-
-<file path=ppt/notesSlides/notesSlide15.xml><?xml version="1.0" encoding="utf-8"?>
-<p:notes xmlns:a="http://schemas.openxmlformats.org/drawingml/2006/main" xmlns:r="http://schemas.openxmlformats.org/officeDocument/2006/relationships" xmlns:p="http://schemas.openxmlformats.org/presentationml/2006/main">
-  <p:cSld>
-    <p:spTree>
-      <p:nvGrpSpPr>
-        <p:cNvPr id="1" name="">
-          <a:extLst>
-            <a:ext uri="{FF2B5EF4-FFF2-40B4-BE49-F238E27FC236}">
-              <a16:creationId xmlns:a16="http://schemas.microsoft.com/office/drawing/2014/main" id="{EA2D2526-76BF-1058-C793-0D01A39B57B5}"/>
-            </a:ext>
-          </a:extLst>
-        </p:cNvPr>
-        <p:cNvGrpSpPr/>
-        <p:nvPr/>
-      </p:nvGrpSpPr>
-      <p:grpSpPr>
-        <a:xfrm>
-          <a:off x="0" y="0"/>
-          <a:ext cx="0" cy="0"/>
-          <a:chOff x="0" y="0"/>
-          <a:chExt cx="0" cy="0"/>
-        </a:xfrm>
-      </p:grpSpPr>
-      <p:sp>
-        <p:nvSpPr>
-          <p:cNvPr id="2" name="Espaço Reservado para Imagem de Slide 1">
-            <a:extLst>
-              <a:ext uri="{FF2B5EF4-FFF2-40B4-BE49-F238E27FC236}">
-                <a16:creationId xmlns:a16="http://schemas.microsoft.com/office/drawing/2014/main" id="{172F1D6D-7876-BD59-85C1-CE4F93A3A4E0}"/>
-              </a:ext>
-            </a:extLst>
-          </p:cNvPr>
-          <p:cNvSpPr>
-            <a:spLocks noGrp="1" noRot="1" noChangeAspect="1"/>
-          </p:cNvSpPr>
-          <p:nvPr>
-            <p:ph type="sldImg"/>
-          </p:nvPr>
-        </p:nvSpPr>
-        <p:spPr>
-          <a:xfrm>
-            <a:off x="381000" y="685800"/>
-            <a:ext cx="6096000" cy="3429000"/>
-          </a:xfrm>
-        </p:spPr>
-      </p:sp>
-      <p:sp>
-        <p:nvSpPr>
-          <p:cNvPr id="3" name="Espaço Reservado para Anotações 2">
-            <a:extLst>
-              <a:ext uri="{FF2B5EF4-FFF2-40B4-BE49-F238E27FC236}">
-                <a16:creationId xmlns:a16="http://schemas.microsoft.com/office/drawing/2014/main" id="{4154DC03-8F4F-F5F9-14A6-5A6D30D64D38}"/>
-              </a:ext>
-            </a:extLst>
-          </p:cNvPr>
-          <p:cNvSpPr>
-            <a:spLocks noGrp="1"/>
-          </p:cNvSpPr>
-          <p:nvPr>
-            <p:ph type="body" idx="1"/>
-          </p:nvPr>
-        </p:nvSpPr>
-        <p:spPr/>
-        <p:txBody>
-          <a:bodyPr/>
-          <a:lstStyle/>
-          <a:p>
-            <a:endParaRPr lang="pt-BR" dirty="0"/>
-          </a:p>
-        </p:txBody>
-      </p:sp>
-    </p:spTree>
-    <p:extLst>
-      <p:ext uri="{BB962C8B-B14F-4D97-AF65-F5344CB8AC3E}">
-        <p14:creationId xmlns:p14="http://schemas.microsoft.com/office/powerpoint/2010/main" val="3302927879"/>
-      </p:ext>
-    </p:extLst>
-  </p:cSld>
-  <p:clrMapOvr>
-    <a:masterClrMapping/>
-  </p:clrMapOvr>
-</p:notes>
-</file>
-
-<file path=ppt/notesSlides/notesSlide16.xml><?xml version="1.0" encoding="utf-8"?>
-<p:notes xmlns:a="http://schemas.openxmlformats.org/drawingml/2006/main" xmlns:r="http://schemas.openxmlformats.org/officeDocument/2006/relationships" xmlns:p="http://schemas.openxmlformats.org/presentationml/2006/main">
-  <p:cSld>
-    <p:spTree>
-      <p:nvGrpSpPr>
-        <p:cNvPr id="1" name="">
-          <a:extLst>
-            <a:ext uri="{FF2B5EF4-FFF2-40B4-BE49-F238E27FC236}">
-              <a16:creationId xmlns:a16="http://schemas.microsoft.com/office/drawing/2014/main" id="{9FF4D68A-1501-0D24-0905-8A003CF8EFC0}"/>
-            </a:ext>
-          </a:extLst>
-        </p:cNvPr>
-        <p:cNvGrpSpPr/>
-        <p:nvPr/>
-      </p:nvGrpSpPr>
-      <p:grpSpPr>
-        <a:xfrm>
-          <a:off x="0" y="0"/>
-          <a:ext cx="0" cy="0"/>
-          <a:chOff x="0" y="0"/>
-          <a:chExt cx="0" cy="0"/>
-        </a:xfrm>
-      </p:grpSpPr>
-      <p:sp>
-        <p:nvSpPr>
-          <p:cNvPr id="2" name="Espaço Reservado para Imagem de Slide 1">
-            <a:extLst>
-              <a:ext uri="{FF2B5EF4-FFF2-40B4-BE49-F238E27FC236}">
-                <a16:creationId xmlns:a16="http://schemas.microsoft.com/office/drawing/2014/main" id="{D37D9626-F199-322F-F480-2F0DF85EA67A}"/>
-              </a:ext>
-            </a:extLst>
-          </p:cNvPr>
-          <p:cNvSpPr>
-            <a:spLocks noGrp="1" noRot="1" noChangeAspect="1"/>
-          </p:cNvSpPr>
-          <p:nvPr>
-            <p:ph type="sldImg"/>
-          </p:nvPr>
-        </p:nvSpPr>
-        <p:spPr>
-          <a:xfrm>
-            <a:off x="381000" y="685800"/>
-            <a:ext cx="6096000" cy="3429000"/>
-          </a:xfrm>
-        </p:spPr>
-      </p:sp>
-      <p:sp>
-        <p:nvSpPr>
-          <p:cNvPr id="3" name="Espaço Reservado para Anotações 2">
-            <a:extLst>
-              <a:ext uri="{FF2B5EF4-FFF2-40B4-BE49-F238E27FC236}">
-                <a16:creationId xmlns:a16="http://schemas.microsoft.com/office/drawing/2014/main" id="{4BD7A2F5-2044-D054-8CA5-F4DC5FF41A51}"/>
-              </a:ext>
-            </a:extLst>
-          </p:cNvPr>
-          <p:cNvSpPr>
-            <a:spLocks noGrp="1"/>
-          </p:cNvSpPr>
-          <p:nvPr>
-            <p:ph type="body" idx="1"/>
-          </p:nvPr>
-        </p:nvSpPr>
-        <p:spPr/>
-        <p:txBody>
-          <a:bodyPr/>
-          <a:lstStyle/>
-          <a:p>
-            <a:endParaRPr lang="pt-BR" dirty="0"/>
-          </a:p>
-        </p:txBody>
-      </p:sp>
-    </p:spTree>
-    <p:extLst>
-      <p:ext uri="{BB962C8B-B14F-4D97-AF65-F5344CB8AC3E}">
-        <p14:creationId xmlns:p14="http://schemas.microsoft.com/office/powerpoint/2010/main" val="4160211408"/>
       </p:ext>
     </p:extLst>
   </p:cSld>
@@ -7865,6 +7865,454 @@
         <p:cNvPr id="1" name="">
           <a:extLst>
             <a:ext uri="{FF2B5EF4-FFF2-40B4-BE49-F238E27FC236}">
+              <a16:creationId xmlns:a16="http://schemas.microsoft.com/office/drawing/2014/main" id="{89E9224B-67E6-B3D7-9D4B-3381286E7B57}"/>
+            </a:ext>
+          </a:extLst>
+        </p:cNvPr>
+        <p:cNvGrpSpPr/>
+        <p:nvPr/>
+      </p:nvGrpSpPr>
+      <p:grpSpPr>
+        <a:xfrm>
+          <a:off x="0" y="0"/>
+          <a:ext cx="0" cy="0"/>
+          <a:chOff x="0" y="0"/>
+          <a:chExt cx="0" cy="0"/>
+        </a:xfrm>
+      </p:grpSpPr>
+      <p:sp>
+        <p:nvSpPr>
+          <p:cNvPr id="6" name="Title 1">
+            <a:extLst>
+              <a:ext uri="{FF2B5EF4-FFF2-40B4-BE49-F238E27FC236}">
+                <a16:creationId xmlns:a16="http://schemas.microsoft.com/office/drawing/2014/main" id="{0AEC9BCB-1359-09B7-F65B-053529BB126F}"/>
+              </a:ext>
+            </a:extLst>
+          </p:cNvPr>
+          <p:cNvSpPr>
+            <a:spLocks noGrp="1"/>
+          </p:cNvSpPr>
+          <p:nvPr>
+            <p:ph type="title"/>
+          </p:nvPr>
+        </p:nvSpPr>
+        <p:spPr>
+          <a:xfrm>
+            <a:off x="457200" y="205980"/>
+            <a:ext cx="8229600" cy="857251"/>
+          </a:xfrm>
+        </p:spPr>
+        <p:txBody>
+          <a:bodyPr>
+            <a:normAutofit fontScale="90000"/>
+          </a:bodyPr>
+          <a:lstStyle/>
+          <a:p>
+            <a:r>
+              <a:rPr lang="en-US" b="1" dirty="0">
+                <a:solidFill>
+                  <a:srgbClr val="0070C0"/>
+                </a:solidFill>
+              </a:rPr>
+              <a:t>Alg. </a:t>
+            </a:r>
+            <a:r>
+              <a:rPr lang="en-US" b="1" dirty="0" err="1">
+                <a:solidFill>
+                  <a:srgbClr val="0070C0"/>
+                </a:solidFill>
+              </a:rPr>
+              <a:t>Ordenação</a:t>
+            </a:r>
+            <a:r>
+              <a:rPr lang="en-US" b="1" dirty="0">
+                <a:solidFill>
+                  <a:srgbClr val="0070C0"/>
+                </a:solidFill>
+              </a:rPr>
+              <a:t> Simples Selection Sort</a:t>
+            </a:r>
+          </a:p>
+        </p:txBody>
+      </p:sp>
+      <p:sp>
+        <p:nvSpPr>
+          <p:cNvPr id="8" name="Text Placeholder 2">
+            <a:extLst>
+              <a:ext uri="{FF2B5EF4-FFF2-40B4-BE49-F238E27FC236}">
+                <a16:creationId xmlns:a16="http://schemas.microsoft.com/office/drawing/2014/main" id="{999A0BBA-8064-8AD7-5B06-BB7A9C656DD6}"/>
+              </a:ext>
+            </a:extLst>
+          </p:cNvPr>
+          <p:cNvSpPr>
+            <a:spLocks noGrp="1"/>
+          </p:cNvSpPr>
+          <p:nvPr>
+            <p:ph type="body" sz="half" idx="1"/>
+          </p:nvPr>
+        </p:nvSpPr>
+        <p:spPr>
+          <a:xfrm>
+            <a:off x="142865" y="1200150"/>
+            <a:ext cx="8865056" cy="3737370"/>
+          </a:xfrm>
+        </p:spPr>
+        <p:txBody>
+          <a:bodyPr>
+            <a:noAutofit/>
+          </a:bodyPr>
+          <a:lstStyle/>
+          <a:p>
+            <a:pPr marL="0" indent="0" algn="just">
+              <a:buNone/>
+            </a:pPr>
+            <a:r>
+              <a:rPr lang="pt-BR" sz="2400" b="1" dirty="0">
+                <a:latin typeface="Times New Roman" panose="02020603050405020304" pitchFamily="18" charset="0"/>
+                <a:cs typeface="Times New Roman" panose="02020603050405020304" pitchFamily="18" charset="0"/>
+              </a:rPr>
+              <a:t>Ideia</a:t>
+            </a:r>
+            <a:r>
+              <a:rPr lang="pt-BR" sz="2400" dirty="0">
+                <a:latin typeface="Times New Roman" panose="02020603050405020304" pitchFamily="18" charset="0"/>
+                <a:cs typeface="Times New Roman" panose="02020603050405020304" pitchFamily="18" charset="0"/>
+              </a:rPr>
+              <a:t>: divide a lista em duas partes: ordenada e não ordenada. </a:t>
+            </a:r>
+          </a:p>
+          <a:p>
+            <a:pPr marL="0" indent="0" algn="just">
+              <a:buNone/>
+            </a:pPr>
+            <a:endParaRPr lang="pt-BR" sz="2400" dirty="0">
+              <a:latin typeface="Times New Roman" panose="02020603050405020304" pitchFamily="18" charset="0"/>
+              <a:cs typeface="Times New Roman" panose="02020603050405020304" pitchFamily="18" charset="0"/>
+            </a:endParaRPr>
+          </a:p>
+          <a:p>
+            <a:pPr marL="0" indent="0" algn="just">
+              <a:buNone/>
+            </a:pPr>
+            <a:r>
+              <a:rPr lang="pt-BR" sz="2400" dirty="0">
+                <a:latin typeface="Times New Roman" panose="02020603050405020304" pitchFamily="18" charset="0"/>
+                <a:cs typeface="Times New Roman" panose="02020603050405020304" pitchFamily="18" charset="0"/>
+              </a:rPr>
+              <a:t>A cada passo, seleciona o menor elemento da parte não ordenada e coloca-o na posição correta.</a:t>
+            </a:r>
+          </a:p>
+          <a:p>
+            <a:pPr marL="0" indent="0" algn="just">
+              <a:buNone/>
+            </a:pPr>
+            <a:endParaRPr lang="pt-BR" sz="2400" dirty="0">
+              <a:latin typeface="Times New Roman" panose="02020603050405020304" pitchFamily="18" charset="0"/>
+              <a:cs typeface="Times New Roman" panose="02020603050405020304" pitchFamily="18" charset="0"/>
+            </a:endParaRPr>
+          </a:p>
+          <a:p>
+            <a:pPr marL="0" indent="0" algn="just">
+              <a:buNone/>
+            </a:pPr>
+            <a:r>
+              <a:rPr lang="pt-BR" sz="2400" b="1" dirty="0">
+                <a:solidFill>
+                  <a:srgbClr val="FF0000"/>
+                </a:solidFill>
+                <a:latin typeface="Times New Roman" panose="02020603050405020304" pitchFamily="18" charset="0"/>
+                <a:cs typeface="Times New Roman" panose="02020603050405020304" pitchFamily="18" charset="0"/>
+              </a:rPr>
+              <a:t>Complexidade</a:t>
+            </a:r>
+            <a:r>
+              <a:rPr lang="pt-BR" sz="2400" dirty="0">
+                <a:latin typeface="Times New Roman" panose="02020603050405020304" pitchFamily="18" charset="0"/>
+                <a:cs typeface="Times New Roman" panose="02020603050405020304" pitchFamily="18" charset="0"/>
+              </a:rPr>
+              <a:t>:</a:t>
+            </a:r>
+          </a:p>
+          <a:p>
+            <a:pPr algn="just">
+              <a:buFont typeface="Wingdings" panose="05000000000000000000" pitchFamily="2" charset="2"/>
+              <a:buChar char="§"/>
+            </a:pPr>
+            <a:r>
+              <a:rPr lang="pt-BR" sz="2400" dirty="0">
+                <a:latin typeface="Times New Roman" panose="02020603050405020304" pitchFamily="18" charset="0"/>
+                <a:cs typeface="Times New Roman" panose="02020603050405020304" pitchFamily="18" charset="0"/>
+              </a:rPr>
+              <a:t>Sempre O(n²), independentemente da ordem inicial.</a:t>
+            </a:r>
+          </a:p>
+        </p:txBody>
+      </p:sp>
+    </p:spTree>
+    <p:extLst>
+      <p:ext uri="{BB962C8B-B14F-4D97-AF65-F5344CB8AC3E}">
+        <p14:creationId xmlns:p14="http://schemas.microsoft.com/office/powerpoint/2010/main" val="2489732956"/>
+      </p:ext>
+    </p:extLst>
+  </p:cSld>
+  <p:clrMapOvr>
+    <a:masterClrMapping/>
+  </p:clrMapOvr>
+  <p:transition spd="med"/>
+</p:sld>
+</file>
+
+<file path=ppt/slides/slide15.xml><?xml version="1.0" encoding="utf-8"?>
+<p:sld xmlns:a="http://schemas.openxmlformats.org/drawingml/2006/main" xmlns:r="http://schemas.openxmlformats.org/officeDocument/2006/relationships" xmlns:p="http://schemas.openxmlformats.org/presentationml/2006/main">
+  <p:cSld>
+    <p:spTree>
+      <p:nvGrpSpPr>
+        <p:cNvPr id="1" name="">
+          <a:extLst>
+            <a:ext uri="{FF2B5EF4-FFF2-40B4-BE49-F238E27FC236}">
+              <a16:creationId xmlns:a16="http://schemas.microsoft.com/office/drawing/2014/main" id="{02D29727-8DBF-CF04-0A30-64D4B49226C0}"/>
+            </a:ext>
+          </a:extLst>
+        </p:cNvPr>
+        <p:cNvGrpSpPr/>
+        <p:nvPr/>
+      </p:nvGrpSpPr>
+      <p:grpSpPr>
+        <a:xfrm>
+          <a:off x="0" y="0"/>
+          <a:ext cx="0" cy="0"/>
+          <a:chOff x="0" y="0"/>
+          <a:chExt cx="0" cy="0"/>
+        </a:xfrm>
+      </p:grpSpPr>
+      <p:sp>
+        <p:nvSpPr>
+          <p:cNvPr id="6" name="Title 1">
+            <a:extLst>
+              <a:ext uri="{FF2B5EF4-FFF2-40B4-BE49-F238E27FC236}">
+                <a16:creationId xmlns:a16="http://schemas.microsoft.com/office/drawing/2014/main" id="{E63956DD-4EBE-48C0-3F0F-501ECB9F7494}"/>
+              </a:ext>
+            </a:extLst>
+          </p:cNvPr>
+          <p:cNvSpPr>
+            <a:spLocks noGrp="1"/>
+          </p:cNvSpPr>
+          <p:nvPr>
+            <p:ph type="title"/>
+          </p:nvPr>
+        </p:nvSpPr>
+        <p:spPr>
+          <a:xfrm>
+            <a:off x="457200" y="205980"/>
+            <a:ext cx="8229600" cy="857251"/>
+          </a:xfrm>
+        </p:spPr>
+        <p:txBody>
+          <a:bodyPr>
+            <a:normAutofit fontScale="90000"/>
+          </a:bodyPr>
+          <a:lstStyle/>
+          <a:p>
+            <a:r>
+              <a:rPr lang="en-US" b="1" dirty="0">
+                <a:solidFill>
+                  <a:srgbClr val="0070C0"/>
+                </a:solidFill>
+              </a:rPr>
+              <a:t>Alg. </a:t>
+            </a:r>
+            <a:r>
+              <a:rPr lang="en-US" b="1" dirty="0" err="1">
+                <a:solidFill>
+                  <a:srgbClr val="0070C0"/>
+                </a:solidFill>
+              </a:rPr>
+              <a:t>Ordenação</a:t>
+            </a:r>
+            <a:r>
+              <a:rPr lang="en-US" b="1" dirty="0">
+                <a:solidFill>
+                  <a:srgbClr val="0070C0"/>
+                </a:solidFill>
+              </a:rPr>
+              <a:t> Simples Selection Sort</a:t>
+            </a:r>
+          </a:p>
+        </p:txBody>
+      </p:sp>
+      <p:sp>
+        <p:nvSpPr>
+          <p:cNvPr id="8" name="Text Placeholder 2">
+            <a:extLst>
+              <a:ext uri="{FF2B5EF4-FFF2-40B4-BE49-F238E27FC236}">
+                <a16:creationId xmlns:a16="http://schemas.microsoft.com/office/drawing/2014/main" id="{B28BE319-4333-2953-7CC2-73D9E8302049}"/>
+              </a:ext>
+            </a:extLst>
+          </p:cNvPr>
+          <p:cNvSpPr>
+            <a:spLocks noGrp="1"/>
+          </p:cNvSpPr>
+          <p:nvPr>
+            <p:ph type="body" sz="half" idx="1"/>
+          </p:nvPr>
+        </p:nvSpPr>
+        <p:spPr>
+          <a:xfrm>
+            <a:off x="142865" y="1200150"/>
+            <a:ext cx="8865056" cy="3737370"/>
+          </a:xfrm>
+        </p:spPr>
+        <p:txBody>
+          <a:bodyPr>
+            <a:noAutofit/>
+          </a:bodyPr>
+          <a:lstStyle/>
+          <a:p>
+            <a:pPr marL="0" indent="0" algn="just">
+              <a:buNone/>
+            </a:pPr>
+            <a:r>
+              <a:rPr lang="pt-BR" sz="2400" b="1" dirty="0">
+                <a:latin typeface="Times New Roman" panose="02020603050405020304" pitchFamily="18" charset="0"/>
+                <a:cs typeface="Times New Roman" panose="02020603050405020304" pitchFamily="18" charset="0"/>
+              </a:rPr>
+              <a:t>Vantagem</a:t>
+            </a:r>
+            <a:r>
+              <a:rPr lang="pt-BR" sz="2400" dirty="0">
+                <a:latin typeface="Times New Roman" panose="02020603050405020304" pitchFamily="18" charset="0"/>
+                <a:cs typeface="Times New Roman" panose="02020603050405020304" pitchFamily="18" charset="0"/>
+              </a:rPr>
+              <a:t>: faz poucas trocas (</a:t>
+            </a:r>
+            <a:r>
+              <a:rPr lang="pt-BR" sz="2400" b="1" dirty="0">
+                <a:solidFill>
+                  <a:srgbClr val="FF0000"/>
+                </a:solidFill>
+                <a:latin typeface="Times New Roman" panose="02020603050405020304" pitchFamily="18" charset="0"/>
+                <a:cs typeface="Times New Roman" panose="02020603050405020304" pitchFamily="18" charset="0"/>
+              </a:rPr>
+              <a:t>no máximo n−1</a:t>
+            </a:r>
+            <a:r>
+              <a:rPr lang="pt-BR" sz="2400" dirty="0">
+                <a:latin typeface="Times New Roman" panose="02020603050405020304" pitchFamily="18" charset="0"/>
+                <a:cs typeface="Times New Roman" panose="02020603050405020304" pitchFamily="18" charset="0"/>
+              </a:rPr>
+              <a:t>).</a:t>
+            </a:r>
+          </a:p>
+          <a:p>
+            <a:pPr marL="0" indent="0" algn="just">
+              <a:buNone/>
+            </a:pPr>
+            <a:endParaRPr lang="pt-BR" sz="2400" dirty="0">
+              <a:latin typeface="Times New Roman" panose="02020603050405020304" pitchFamily="18" charset="0"/>
+              <a:cs typeface="Times New Roman" panose="02020603050405020304" pitchFamily="18" charset="0"/>
+            </a:endParaRPr>
+          </a:p>
+          <a:p>
+            <a:pPr marL="0" indent="0" algn="just">
+              <a:buNone/>
+            </a:pPr>
+            <a:r>
+              <a:rPr lang="pt-BR" sz="2400" b="1" dirty="0">
+                <a:solidFill>
+                  <a:srgbClr val="FF0000"/>
+                </a:solidFill>
+                <a:latin typeface="Times New Roman" panose="02020603050405020304" pitchFamily="18" charset="0"/>
+                <a:cs typeface="Times New Roman" panose="02020603050405020304" pitchFamily="18" charset="0"/>
+              </a:rPr>
+              <a:t>Desvantagem</a:t>
+            </a:r>
+            <a:r>
+              <a:rPr lang="pt-BR" sz="2400" dirty="0">
+                <a:latin typeface="Times New Roman" panose="02020603050405020304" pitchFamily="18" charset="0"/>
+                <a:cs typeface="Times New Roman" panose="02020603050405020304" pitchFamily="18" charset="0"/>
+              </a:rPr>
+              <a:t>: número elevado de comparações, mesmo em listas pequenas já ordenadas.</a:t>
+            </a:r>
+          </a:p>
+          <a:p>
+            <a:pPr marL="0" indent="0" algn="just">
+              <a:buNone/>
+            </a:pPr>
+            <a:endParaRPr lang="pt-BR" sz="2400" dirty="0">
+              <a:latin typeface="Times New Roman" panose="02020603050405020304" pitchFamily="18" charset="0"/>
+              <a:cs typeface="Times New Roman" panose="02020603050405020304" pitchFamily="18" charset="0"/>
+            </a:endParaRPr>
+          </a:p>
+          <a:p>
+            <a:pPr marL="0" indent="0" algn="just">
+              <a:buNone/>
+            </a:pPr>
+            <a:r>
+              <a:rPr lang="pt-BR" sz="2400" b="1" dirty="0">
+                <a:solidFill>
+                  <a:srgbClr val="FF0000"/>
+                </a:solidFill>
+                <a:latin typeface="Times New Roman" panose="02020603050405020304" pitchFamily="18" charset="0"/>
+                <a:cs typeface="Times New Roman" panose="02020603050405020304" pitchFamily="18" charset="0"/>
+              </a:rPr>
+              <a:t>Exemplo</a:t>
+            </a:r>
+            <a:r>
+              <a:rPr lang="pt-BR" sz="2400" dirty="0">
+                <a:latin typeface="Times New Roman" panose="02020603050405020304" pitchFamily="18" charset="0"/>
+                <a:cs typeface="Times New Roman" panose="02020603050405020304" pitchFamily="18" charset="0"/>
+              </a:rPr>
+              <a:t> (5, 3, 4):</a:t>
+            </a:r>
+          </a:p>
+          <a:p>
+            <a:pPr marL="0" indent="0" algn="just">
+              <a:buNone/>
+            </a:pPr>
+            <a:r>
+              <a:rPr lang="pt-BR" sz="2400" dirty="0">
+                <a:latin typeface="Times New Roman" panose="02020603050405020304" pitchFamily="18" charset="0"/>
+                <a:cs typeface="Times New Roman" panose="02020603050405020304" pitchFamily="18" charset="0"/>
+              </a:rPr>
+              <a:t>			1ª Iteração - Seleciona 3 =&gt; (3, 5, 4)</a:t>
+            </a:r>
+          </a:p>
+          <a:p>
+            <a:pPr marL="0" indent="0" algn="just">
+              <a:buNone/>
+            </a:pPr>
+            <a:r>
+              <a:rPr lang="pt-BR" sz="2400" dirty="0">
+                <a:latin typeface="Times New Roman" panose="02020603050405020304" pitchFamily="18" charset="0"/>
+                <a:cs typeface="Times New Roman" panose="02020603050405020304" pitchFamily="18" charset="0"/>
+              </a:rPr>
+              <a:t>			2ª Iteração - Seleciona 4 =&gt; (3, 4, 5)</a:t>
+            </a:r>
+          </a:p>
+        </p:txBody>
+      </p:sp>
+    </p:spTree>
+    <p:extLst>
+      <p:ext uri="{BB962C8B-B14F-4D97-AF65-F5344CB8AC3E}">
+        <p14:creationId xmlns:p14="http://schemas.microsoft.com/office/powerpoint/2010/main" val="3473920957"/>
+      </p:ext>
+    </p:extLst>
+  </p:cSld>
+  <p:clrMapOvr>
+    <a:masterClrMapping/>
+  </p:clrMapOvr>
+  <p:transition spd="med"/>
+</p:sld>
+</file>
+
+<file path=ppt/slides/slide16.xml><?xml version="1.0" encoding="utf-8"?>
+<p:sld xmlns:a="http://schemas.openxmlformats.org/drawingml/2006/main" xmlns:r="http://schemas.openxmlformats.org/officeDocument/2006/relationships" xmlns:p="http://schemas.openxmlformats.org/presentationml/2006/main">
+  <p:cSld>
+    <p:spTree>
+      <p:nvGrpSpPr>
+        <p:cNvPr id="1" name="">
+          <a:extLst>
+            <a:ext uri="{FF2B5EF4-FFF2-40B4-BE49-F238E27FC236}">
               <a16:creationId xmlns:a16="http://schemas.microsoft.com/office/drawing/2014/main" id="{3D4A68D0-4166-6927-D47A-2A912E623869}"/>
             </a:ext>
           </a:extLst>
@@ -8103,7 +8551,7 @@
 </p:sld>
 </file>
 
-<file path=ppt/slides/slide15.xml><?xml version="1.0" encoding="utf-8"?>
+<file path=ppt/slides/slide17.xml><?xml version="1.0" encoding="utf-8"?>
 <p:sld xmlns:a="http://schemas.openxmlformats.org/drawingml/2006/main" xmlns:r="http://schemas.openxmlformats.org/officeDocument/2006/relationships" xmlns:p="http://schemas.openxmlformats.org/presentationml/2006/main">
   <p:cSld>
     <p:spTree>
@@ -8316,454 +8764,6 @@
     <p:extLst>
       <p:ext uri="{BB962C8B-B14F-4D97-AF65-F5344CB8AC3E}">
         <p14:creationId xmlns:p14="http://schemas.microsoft.com/office/powerpoint/2010/main" val="125069629"/>
-      </p:ext>
-    </p:extLst>
-  </p:cSld>
-  <p:clrMapOvr>
-    <a:masterClrMapping/>
-  </p:clrMapOvr>
-  <p:transition spd="med"/>
-</p:sld>
-</file>
-
-<file path=ppt/slides/slide16.xml><?xml version="1.0" encoding="utf-8"?>
-<p:sld xmlns:a="http://schemas.openxmlformats.org/drawingml/2006/main" xmlns:r="http://schemas.openxmlformats.org/officeDocument/2006/relationships" xmlns:p="http://schemas.openxmlformats.org/presentationml/2006/main">
-  <p:cSld>
-    <p:spTree>
-      <p:nvGrpSpPr>
-        <p:cNvPr id="1" name="">
-          <a:extLst>
-            <a:ext uri="{FF2B5EF4-FFF2-40B4-BE49-F238E27FC236}">
-              <a16:creationId xmlns:a16="http://schemas.microsoft.com/office/drawing/2014/main" id="{89E9224B-67E6-B3D7-9D4B-3381286E7B57}"/>
-            </a:ext>
-          </a:extLst>
-        </p:cNvPr>
-        <p:cNvGrpSpPr/>
-        <p:nvPr/>
-      </p:nvGrpSpPr>
-      <p:grpSpPr>
-        <a:xfrm>
-          <a:off x="0" y="0"/>
-          <a:ext cx="0" cy="0"/>
-          <a:chOff x="0" y="0"/>
-          <a:chExt cx="0" cy="0"/>
-        </a:xfrm>
-      </p:grpSpPr>
-      <p:sp>
-        <p:nvSpPr>
-          <p:cNvPr id="6" name="Title 1">
-            <a:extLst>
-              <a:ext uri="{FF2B5EF4-FFF2-40B4-BE49-F238E27FC236}">
-                <a16:creationId xmlns:a16="http://schemas.microsoft.com/office/drawing/2014/main" id="{0AEC9BCB-1359-09B7-F65B-053529BB126F}"/>
-              </a:ext>
-            </a:extLst>
-          </p:cNvPr>
-          <p:cNvSpPr>
-            <a:spLocks noGrp="1"/>
-          </p:cNvSpPr>
-          <p:nvPr>
-            <p:ph type="title"/>
-          </p:nvPr>
-        </p:nvSpPr>
-        <p:spPr>
-          <a:xfrm>
-            <a:off x="457200" y="205980"/>
-            <a:ext cx="8229600" cy="857251"/>
-          </a:xfrm>
-        </p:spPr>
-        <p:txBody>
-          <a:bodyPr>
-            <a:normAutofit fontScale="90000"/>
-          </a:bodyPr>
-          <a:lstStyle/>
-          <a:p>
-            <a:r>
-              <a:rPr lang="en-US" b="1" dirty="0">
-                <a:solidFill>
-                  <a:srgbClr val="0070C0"/>
-                </a:solidFill>
-              </a:rPr>
-              <a:t>Alg. </a:t>
-            </a:r>
-            <a:r>
-              <a:rPr lang="en-US" b="1" dirty="0" err="1">
-                <a:solidFill>
-                  <a:srgbClr val="0070C0"/>
-                </a:solidFill>
-              </a:rPr>
-              <a:t>Ordenação</a:t>
-            </a:r>
-            <a:r>
-              <a:rPr lang="en-US" b="1" dirty="0">
-                <a:solidFill>
-                  <a:srgbClr val="0070C0"/>
-                </a:solidFill>
-              </a:rPr>
-              <a:t> Simples Selection Sort</a:t>
-            </a:r>
-          </a:p>
-        </p:txBody>
-      </p:sp>
-      <p:sp>
-        <p:nvSpPr>
-          <p:cNvPr id="8" name="Text Placeholder 2">
-            <a:extLst>
-              <a:ext uri="{FF2B5EF4-FFF2-40B4-BE49-F238E27FC236}">
-                <a16:creationId xmlns:a16="http://schemas.microsoft.com/office/drawing/2014/main" id="{999A0BBA-8064-8AD7-5B06-BB7A9C656DD6}"/>
-              </a:ext>
-            </a:extLst>
-          </p:cNvPr>
-          <p:cNvSpPr>
-            <a:spLocks noGrp="1"/>
-          </p:cNvSpPr>
-          <p:nvPr>
-            <p:ph type="body" sz="half" idx="1"/>
-          </p:nvPr>
-        </p:nvSpPr>
-        <p:spPr>
-          <a:xfrm>
-            <a:off x="142865" y="1200150"/>
-            <a:ext cx="8865056" cy="3737370"/>
-          </a:xfrm>
-        </p:spPr>
-        <p:txBody>
-          <a:bodyPr>
-            <a:noAutofit/>
-          </a:bodyPr>
-          <a:lstStyle/>
-          <a:p>
-            <a:pPr marL="0" indent="0" algn="just">
-              <a:buNone/>
-            </a:pPr>
-            <a:r>
-              <a:rPr lang="pt-BR" sz="2400" b="1" dirty="0">
-                <a:latin typeface="Times New Roman" panose="02020603050405020304" pitchFamily="18" charset="0"/>
-                <a:cs typeface="Times New Roman" panose="02020603050405020304" pitchFamily="18" charset="0"/>
-              </a:rPr>
-              <a:t>Ideia</a:t>
-            </a:r>
-            <a:r>
-              <a:rPr lang="pt-BR" sz="2400" dirty="0">
-                <a:latin typeface="Times New Roman" panose="02020603050405020304" pitchFamily="18" charset="0"/>
-                <a:cs typeface="Times New Roman" panose="02020603050405020304" pitchFamily="18" charset="0"/>
-              </a:rPr>
-              <a:t>: divide a lista em duas partes: ordenada e não ordenada. </a:t>
-            </a:r>
-          </a:p>
-          <a:p>
-            <a:pPr marL="0" indent="0" algn="just">
-              <a:buNone/>
-            </a:pPr>
-            <a:endParaRPr lang="pt-BR" sz="2400" dirty="0">
-              <a:latin typeface="Times New Roman" panose="02020603050405020304" pitchFamily="18" charset="0"/>
-              <a:cs typeface="Times New Roman" panose="02020603050405020304" pitchFamily="18" charset="0"/>
-            </a:endParaRPr>
-          </a:p>
-          <a:p>
-            <a:pPr marL="0" indent="0" algn="just">
-              <a:buNone/>
-            </a:pPr>
-            <a:r>
-              <a:rPr lang="pt-BR" sz="2400" dirty="0">
-                <a:latin typeface="Times New Roman" panose="02020603050405020304" pitchFamily="18" charset="0"/>
-                <a:cs typeface="Times New Roman" panose="02020603050405020304" pitchFamily="18" charset="0"/>
-              </a:rPr>
-              <a:t>A cada passo, seleciona o menor elemento da parte não ordenada e coloca-o na posição correta.</a:t>
-            </a:r>
-          </a:p>
-          <a:p>
-            <a:pPr marL="0" indent="0" algn="just">
-              <a:buNone/>
-            </a:pPr>
-            <a:endParaRPr lang="pt-BR" sz="2400" dirty="0">
-              <a:latin typeface="Times New Roman" panose="02020603050405020304" pitchFamily="18" charset="0"/>
-              <a:cs typeface="Times New Roman" panose="02020603050405020304" pitchFamily="18" charset="0"/>
-            </a:endParaRPr>
-          </a:p>
-          <a:p>
-            <a:pPr marL="0" indent="0" algn="just">
-              <a:buNone/>
-            </a:pPr>
-            <a:r>
-              <a:rPr lang="pt-BR" sz="2400" b="1" dirty="0">
-                <a:solidFill>
-                  <a:srgbClr val="FF0000"/>
-                </a:solidFill>
-                <a:latin typeface="Times New Roman" panose="02020603050405020304" pitchFamily="18" charset="0"/>
-                <a:cs typeface="Times New Roman" panose="02020603050405020304" pitchFamily="18" charset="0"/>
-              </a:rPr>
-              <a:t>Complexidade</a:t>
-            </a:r>
-            <a:r>
-              <a:rPr lang="pt-BR" sz="2400" dirty="0">
-                <a:latin typeface="Times New Roman" panose="02020603050405020304" pitchFamily="18" charset="0"/>
-                <a:cs typeface="Times New Roman" panose="02020603050405020304" pitchFamily="18" charset="0"/>
-              </a:rPr>
-              <a:t>:</a:t>
-            </a:r>
-          </a:p>
-          <a:p>
-            <a:pPr algn="just">
-              <a:buFont typeface="Wingdings" panose="05000000000000000000" pitchFamily="2" charset="2"/>
-              <a:buChar char="§"/>
-            </a:pPr>
-            <a:r>
-              <a:rPr lang="pt-BR" sz="2400" dirty="0">
-                <a:latin typeface="Times New Roman" panose="02020603050405020304" pitchFamily="18" charset="0"/>
-                <a:cs typeface="Times New Roman" panose="02020603050405020304" pitchFamily="18" charset="0"/>
-              </a:rPr>
-              <a:t>Sempre O(n²), independentemente da ordem inicial.</a:t>
-            </a:r>
-          </a:p>
-        </p:txBody>
-      </p:sp>
-    </p:spTree>
-    <p:extLst>
-      <p:ext uri="{BB962C8B-B14F-4D97-AF65-F5344CB8AC3E}">
-        <p14:creationId xmlns:p14="http://schemas.microsoft.com/office/powerpoint/2010/main" val="2489732956"/>
-      </p:ext>
-    </p:extLst>
-  </p:cSld>
-  <p:clrMapOvr>
-    <a:masterClrMapping/>
-  </p:clrMapOvr>
-  <p:transition spd="med"/>
-</p:sld>
-</file>
-
-<file path=ppt/slides/slide17.xml><?xml version="1.0" encoding="utf-8"?>
-<p:sld xmlns:a="http://schemas.openxmlformats.org/drawingml/2006/main" xmlns:r="http://schemas.openxmlformats.org/officeDocument/2006/relationships" xmlns:p="http://schemas.openxmlformats.org/presentationml/2006/main">
-  <p:cSld>
-    <p:spTree>
-      <p:nvGrpSpPr>
-        <p:cNvPr id="1" name="">
-          <a:extLst>
-            <a:ext uri="{FF2B5EF4-FFF2-40B4-BE49-F238E27FC236}">
-              <a16:creationId xmlns:a16="http://schemas.microsoft.com/office/drawing/2014/main" id="{02D29727-8DBF-CF04-0A30-64D4B49226C0}"/>
-            </a:ext>
-          </a:extLst>
-        </p:cNvPr>
-        <p:cNvGrpSpPr/>
-        <p:nvPr/>
-      </p:nvGrpSpPr>
-      <p:grpSpPr>
-        <a:xfrm>
-          <a:off x="0" y="0"/>
-          <a:ext cx="0" cy="0"/>
-          <a:chOff x="0" y="0"/>
-          <a:chExt cx="0" cy="0"/>
-        </a:xfrm>
-      </p:grpSpPr>
-      <p:sp>
-        <p:nvSpPr>
-          <p:cNvPr id="6" name="Title 1">
-            <a:extLst>
-              <a:ext uri="{FF2B5EF4-FFF2-40B4-BE49-F238E27FC236}">
-                <a16:creationId xmlns:a16="http://schemas.microsoft.com/office/drawing/2014/main" id="{E63956DD-4EBE-48C0-3F0F-501ECB9F7494}"/>
-              </a:ext>
-            </a:extLst>
-          </p:cNvPr>
-          <p:cNvSpPr>
-            <a:spLocks noGrp="1"/>
-          </p:cNvSpPr>
-          <p:nvPr>
-            <p:ph type="title"/>
-          </p:nvPr>
-        </p:nvSpPr>
-        <p:spPr>
-          <a:xfrm>
-            <a:off x="457200" y="205980"/>
-            <a:ext cx="8229600" cy="857251"/>
-          </a:xfrm>
-        </p:spPr>
-        <p:txBody>
-          <a:bodyPr>
-            <a:normAutofit fontScale="90000"/>
-          </a:bodyPr>
-          <a:lstStyle/>
-          <a:p>
-            <a:r>
-              <a:rPr lang="en-US" b="1" dirty="0">
-                <a:solidFill>
-                  <a:srgbClr val="0070C0"/>
-                </a:solidFill>
-              </a:rPr>
-              <a:t>Alg. </a:t>
-            </a:r>
-            <a:r>
-              <a:rPr lang="en-US" b="1" dirty="0" err="1">
-                <a:solidFill>
-                  <a:srgbClr val="0070C0"/>
-                </a:solidFill>
-              </a:rPr>
-              <a:t>Ordenação</a:t>
-            </a:r>
-            <a:r>
-              <a:rPr lang="en-US" b="1" dirty="0">
-                <a:solidFill>
-                  <a:srgbClr val="0070C0"/>
-                </a:solidFill>
-              </a:rPr>
-              <a:t> Simples Selection Sort</a:t>
-            </a:r>
-          </a:p>
-        </p:txBody>
-      </p:sp>
-      <p:sp>
-        <p:nvSpPr>
-          <p:cNvPr id="8" name="Text Placeholder 2">
-            <a:extLst>
-              <a:ext uri="{FF2B5EF4-FFF2-40B4-BE49-F238E27FC236}">
-                <a16:creationId xmlns:a16="http://schemas.microsoft.com/office/drawing/2014/main" id="{B28BE319-4333-2953-7CC2-73D9E8302049}"/>
-              </a:ext>
-            </a:extLst>
-          </p:cNvPr>
-          <p:cNvSpPr>
-            <a:spLocks noGrp="1"/>
-          </p:cNvSpPr>
-          <p:nvPr>
-            <p:ph type="body" sz="half" idx="1"/>
-          </p:nvPr>
-        </p:nvSpPr>
-        <p:spPr>
-          <a:xfrm>
-            <a:off x="142865" y="1200150"/>
-            <a:ext cx="8865056" cy="3737370"/>
-          </a:xfrm>
-        </p:spPr>
-        <p:txBody>
-          <a:bodyPr>
-            <a:noAutofit/>
-          </a:bodyPr>
-          <a:lstStyle/>
-          <a:p>
-            <a:pPr marL="0" indent="0" algn="just">
-              <a:buNone/>
-            </a:pPr>
-            <a:r>
-              <a:rPr lang="pt-BR" sz="2400" b="1" dirty="0">
-                <a:latin typeface="Times New Roman" panose="02020603050405020304" pitchFamily="18" charset="0"/>
-                <a:cs typeface="Times New Roman" panose="02020603050405020304" pitchFamily="18" charset="0"/>
-              </a:rPr>
-              <a:t>Vantagem</a:t>
-            </a:r>
-            <a:r>
-              <a:rPr lang="pt-BR" sz="2400" dirty="0">
-                <a:latin typeface="Times New Roman" panose="02020603050405020304" pitchFamily="18" charset="0"/>
-                <a:cs typeface="Times New Roman" panose="02020603050405020304" pitchFamily="18" charset="0"/>
-              </a:rPr>
-              <a:t>: faz poucas trocas (</a:t>
-            </a:r>
-            <a:r>
-              <a:rPr lang="pt-BR" sz="2400" b="1" dirty="0">
-                <a:solidFill>
-                  <a:srgbClr val="FF0000"/>
-                </a:solidFill>
-                <a:latin typeface="Times New Roman" panose="02020603050405020304" pitchFamily="18" charset="0"/>
-                <a:cs typeface="Times New Roman" panose="02020603050405020304" pitchFamily="18" charset="0"/>
-              </a:rPr>
-              <a:t>no máximo n−1</a:t>
-            </a:r>
-            <a:r>
-              <a:rPr lang="pt-BR" sz="2400" dirty="0">
-                <a:latin typeface="Times New Roman" panose="02020603050405020304" pitchFamily="18" charset="0"/>
-                <a:cs typeface="Times New Roman" panose="02020603050405020304" pitchFamily="18" charset="0"/>
-              </a:rPr>
-              <a:t>).</a:t>
-            </a:r>
-          </a:p>
-          <a:p>
-            <a:pPr marL="0" indent="0" algn="just">
-              <a:buNone/>
-            </a:pPr>
-            <a:endParaRPr lang="pt-BR" sz="2400" dirty="0">
-              <a:latin typeface="Times New Roman" panose="02020603050405020304" pitchFamily="18" charset="0"/>
-              <a:cs typeface="Times New Roman" panose="02020603050405020304" pitchFamily="18" charset="0"/>
-            </a:endParaRPr>
-          </a:p>
-          <a:p>
-            <a:pPr marL="0" indent="0" algn="just">
-              <a:buNone/>
-            </a:pPr>
-            <a:r>
-              <a:rPr lang="pt-BR" sz="2400" b="1" dirty="0">
-                <a:solidFill>
-                  <a:srgbClr val="FF0000"/>
-                </a:solidFill>
-                <a:latin typeface="Times New Roman" panose="02020603050405020304" pitchFamily="18" charset="0"/>
-                <a:cs typeface="Times New Roman" panose="02020603050405020304" pitchFamily="18" charset="0"/>
-              </a:rPr>
-              <a:t>Desvantagem</a:t>
-            </a:r>
-            <a:r>
-              <a:rPr lang="pt-BR" sz="2400" dirty="0">
-                <a:latin typeface="Times New Roman" panose="02020603050405020304" pitchFamily="18" charset="0"/>
-                <a:cs typeface="Times New Roman" panose="02020603050405020304" pitchFamily="18" charset="0"/>
-              </a:rPr>
-              <a:t>: número elevado de comparações, mesmo em listas pequenas já ordenadas.</a:t>
-            </a:r>
-          </a:p>
-          <a:p>
-            <a:pPr marL="0" indent="0" algn="just">
-              <a:buNone/>
-            </a:pPr>
-            <a:endParaRPr lang="pt-BR" sz="2400" dirty="0">
-              <a:latin typeface="Times New Roman" panose="02020603050405020304" pitchFamily="18" charset="0"/>
-              <a:cs typeface="Times New Roman" panose="02020603050405020304" pitchFamily="18" charset="0"/>
-            </a:endParaRPr>
-          </a:p>
-          <a:p>
-            <a:pPr marL="0" indent="0" algn="just">
-              <a:buNone/>
-            </a:pPr>
-            <a:r>
-              <a:rPr lang="pt-BR" sz="2400" b="1" dirty="0">
-                <a:solidFill>
-                  <a:srgbClr val="FF0000"/>
-                </a:solidFill>
-                <a:latin typeface="Times New Roman" panose="02020603050405020304" pitchFamily="18" charset="0"/>
-                <a:cs typeface="Times New Roman" panose="02020603050405020304" pitchFamily="18" charset="0"/>
-              </a:rPr>
-              <a:t>Exemplo</a:t>
-            </a:r>
-            <a:r>
-              <a:rPr lang="pt-BR" sz="2400" dirty="0">
-                <a:latin typeface="Times New Roman" panose="02020603050405020304" pitchFamily="18" charset="0"/>
-                <a:cs typeface="Times New Roman" panose="02020603050405020304" pitchFamily="18" charset="0"/>
-              </a:rPr>
-              <a:t> (5, 3, 4):</a:t>
-            </a:r>
-          </a:p>
-          <a:p>
-            <a:pPr marL="0" indent="0" algn="just">
-              <a:buNone/>
-            </a:pPr>
-            <a:r>
-              <a:rPr lang="pt-BR" sz="2400" dirty="0">
-                <a:latin typeface="Times New Roman" panose="02020603050405020304" pitchFamily="18" charset="0"/>
-                <a:cs typeface="Times New Roman" panose="02020603050405020304" pitchFamily="18" charset="0"/>
-              </a:rPr>
-              <a:t>			1ª Iteração - Seleciona 3 =&gt; (3, 5, 4)</a:t>
-            </a:r>
-          </a:p>
-          <a:p>
-            <a:pPr marL="0" indent="0" algn="just">
-              <a:buNone/>
-            </a:pPr>
-            <a:r>
-              <a:rPr lang="pt-BR" sz="2400" dirty="0">
-                <a:latin typeface="Times New Roman" panose="02020603050405020304" pitchFamily="18" charset="0"/>
-                <a:cs typeface="Times New Roman" panose="02020603050405020304" pitchFamily="18" charset="0"/>
-              </a:rPr>
-              <a:t>			2ª Iteração - Seleciona 4 =&gt; (3, 4, 5)</a:t>
-            </a:r>
-          </a:p>
-        </p:txBody>
-      </p:sp>
-    </p:spTree>
-    <p:extLst>
-      <p:ext uri="{BB962C8B-B14F-4D97-AF65-F5344CB8AC3E}">
-        <p14:creationId xmlns:p14="http://schemas.microsoft.com/office/powerpoint/2010/main" val="3473920957"/>
       </p:ext>
     </p:extLst>
   </p:cSld>
@@ -9864,7 +9864,7 @@
           <p:nvPr>
             <p:extLst>
               <p:ext uri="{D42A27DB-BD31-4B8C-83A1-F6EECF244321}">
-                <p14:modId xmlns:p14="http://schemas.microsoft.com/office/powerpoint/2010/main" val="12228573"/>
+                <p14:modId xmlns:p14="http://schemas.microsoft.com/office/powerpoint/2010/main" val="588045670"/>
               </p:ext>
             </p:extLst>
           </p:nvPr>
@@ -10076,181 +10076,6 @@
                         <a:buNone/>
                       </a:pPr>
                       <a:r>
-                        <a:rPr lang="pt-BR" sz="2000" kern="100" dirty="0">
-                          <a:effectLst/>
-                          <a:latin typeface="Times New Roman" panose="02020603050405020304" pitchFamily="18" charset="0"/>
-                          <a:cs typeface="Times New Roman" panose="02020603050405020304" pitchFamily="18" charset="0"/>
-                        </a:rPr>
-                        <a:t>Bubble </a:t>
-                      </a:r>
-                      <a:r>
-                        <a:rPr lang="pt-BR" sz="2000" kern="100" dirty="0" err="1">
-                          <a:effectLst/>
-                          <a:latin typeface="Times New Roman" panose="02020603050405020304" pitchFamily="18" charset="0"/>
-                          <a:cs typeface="Times New Roman" panose="02020603050405020304" pitchFamily="18" charset="0"/>
-                        </a:rPr>
-                        <a:t>Sort</a:t>
-                      </a:r>
-                      <a:endParaRPr lang="pt-BR" sz="2000" kern="100" dirty="0">
-                        <a:effectLst/>
-                        <a:latin typeface="Times New Roman" panose="02020603050405020304" pitchFamily="18" charset="0"/>
-                        <a:ea typeface="Aptos" panose="020B0004020202020204" pitchFamily="34" charset="0"/>
-                        <a:cs typeface="Times New Roman" panose="02020603050405020304" pitchFamily="18" charset="0"/>
-                      </a:endParaRPr>
-                    </a:p>
-                  </a:txBody>
-                  <a:tcPr marL="9525" marR="9525" marT="9525" marB="9525" anchor="ctr"/>
-                </a:tc>
-                <a:tc>
-                  <a:txBody>
-                    <a:bodyPr/>
-                    <a:lstStyle/>
-                    <a:p>
-                      <a:pPr algn="ctr">
-                        <a:lnSpc>
-                          <a:spcPct val="107000"/>
-                        </a:lnSpc>
-                        <a:spcAft>
-                          <a:spcPts val="800"/>
-                        </a:spcAft>
-                        <a:buNone/>
-                      </a:pPr>
-                      <a:r>
-                        <a:rPr lang="pt-BR" sz="2000" kern="100" dirty="0">
-                          <a:effectLst/>
-                          <a:latin typeface="Times New Roman" panose="02020603050405020304" pitchFamily="18" charset="0"/>
-                          <a:cs typeface="Times New Roman" panose="02020603050405020304" pitchFamily="18" charset="0"/>
-                        </a:rPr>
-                        <a:t>O(n</a:t>
-                      </a:r>
-                      <a:r>
-                        <a:rPr lang="pt-BR" sz="2000" kern="100" baseline="30000" dirty="0">
-                          <a:effectLst/>
-                          <a:latin typeface="Times New Roman" panose="02020603050405020304" pitchFamily="18" charset="0"/>
-                          <a:cs typeface="Times New Roman" panose="02020603050405020304" pitchFamily="18" charset="0"/>
-                        </a:rPr>
-                        <a:t>2</a:t>
-                      </a:r>
-                      <a:r>
-                        <a:rPr lang="pt-BR" sz="2000" kern="100" dirty="0">
-                          <a:effectLst/>
-                          <a:latin typeface="Times New Roman" panose="02020603050405020304" pitchFamily="18" charset="0"/>
-                          <a:cs typeface="Times New Roman" panose="02020603050405020304" pitchFamily="18" charset="0"/>
-                        </a:rPr>
-                        <a:t>)</a:t>
-                      </a:r>
-                      <a:endParaRPr lang="pt-BR" sz="2000" kern="100" dirty="0">
-                        <a:effectLst/>
-                        <a:latin typeface="Times New Roman" panose="02020603050405020304" pitchFamily="18" charset="0"/>
-                        <a:ea typeface="Aptos" panose="020B0004020202020204" pitchFamily="34" charset="0"/>
-                        <a:cs typeface="Times New Roman" panose="02020603050405020304" pitchFamily="18" charset="0"/>
-                      </a:endParaRPr>
-                    </a:p>
-                  </a:txBody>
-                  <a:tcPr marL="9525" marR="9525" marT="9525" marB="9525" anchor="ctr"/>
-                </a:tc>
-                <a:tc>
-                  <a:txBody>
-                    <a:bodyPr/>
-                    <a:lstStyle/>
-                    <a:p>
-                      <a:pPr algn="l">
-                        <a:lnSpc>
-                          <a:spcPct val="107000"/>
-                        </a:lnSpc>
-                        <a:spcAft>
-                          <a:spcPts val="800"/>
-                        </a:spcAft>
-                        <a:buNone/>
-                      </a:pPr>
-                      <a:r>
-                        <a:rPr lang="pt-BR" sz="2000" kern="100" dirty="0">
-                          <a:effectLst/>
-                          <a:latin typeface="Times New Roman" panose="02020603050405020304" pitchFamily="18" charset="0"/>
-                          <a:cs typeface="Times New Roman" panose="02020603050405020304" pitchFamily="18" charset="0"/>
-                        </a:rPr>
-                        <a:t>Aprendizado, simplicidade</a:t>
-                      </a:r>
-                      <a:endParaRPr lang="pt-BR" sz="2000" kern="100" dirty="0">
-                        <a:effectLst/>
-                        <a:latin typeface="Times New Roman" panose="02020603050405020304" pitchFamily="18" charset="0"/>
-                        <a:ea typeface="Aptos" panose="020B0004020202020204" pitchFamily="34" charset="0"/>
-                        <a:cs typeface="Times New Roman" panose="02020603050405020304" pitchFamily="18" charset="0"/>
-                      </a:endParaRPr>
-                    </a:p>
-                  </a:txBody>
-                  <a:tcPr marL="9525" marR="9525" marT="9525" marB="9525" anchor="ctr"/>
-                </a:tc>
-                <a:tc>
-                  <a:txBody>
-                    <a:bodyPr/>
-                    <a:lstStyle/>
-                    <a:p>
-                      <a:pPr algn="l">
-                        <a:lnSpc>
-                          <a:spcPct val="107000"/>
-                        </a:lnSpc>
-                        <a:spcAft>
-                          <a:spcPts val="800"/>
-                        </a:spcAft>
-                        <a:buNone/>
-                      </a:pPr>
-                      <a:r>
-                        <a:rPr lang="pt-BR" sz="2000" kern="100">
-                          <a:effectLst/>
-                          <a:latin typeface="Times New Roman" panose="02020603050405020304" pitchFamily="18" charset="0"/>
-                          <a:cs typeface="Times New Roman" panose="02020603050405020304" pitchFamily="18" charset="0"/>
-                        </a:rPr>
-                        <a:t>Muitas</a:t>
-                      </a:r>
-                      <a:endParaRPr lang="pt-BR" sz="2000" kern="100">
-                        <a:effectLst/>
-                        <a:latin typeface="Times New Roman" panose="02020603050405020304" pitchFamily="18" charset="0"/>
-                        <a:ea typeface="Aptos" panose="020B0004020202020204" pitchFamily="34" charset="0"/>
-                        <a:cs typeface="Times New Roman" panose="02020603050405020304" pitchFamily="18" charset="0"/>
-                      </a:endParaRPr>
-                    </a:p>
-                  </a:txBody>
-                  <a:tcPr marL="9525" marR="9525" marT="9525" marB="9525" anchor="ctr"/>
-                </a:tc>
-                <a:extLst>
-                  <a:ext uri="{0D108BD9-81ED-4DB2-BD59-A6C34878D82A}">
-                    <a16:rowId xmlns:a16="http://schemas.microsoft.com/office/drawing/2014/main" val="2382154496"/>
-                  </a:ext>
-                </a:extLst>
-              </a:tr>
-              <a:tr h="0">
-                <a:tc>
-                  <a:txBody>
-                    <a:bodyPr/>
-                    <a:lstStyle/>
-                    <a:p>
-                      <a:pPr>
-                        <a:lnSpc>
-                          <a:spcPct val="107000"/>
-                        </a:lnSpc>
-                        <a:spcAft>
-                          <a:spcPts val="800"/>
-                        </a:spcAft>
-                        <a:buNone/>
-                      </a:pPr>
-                      <a:endParaRPr lang="pt-BR" sz="2000" kern="100" dirty="0">
-                        <a:effectLst/>
-                        <a:latin typeface="Times New Roman" panose="02020603050405020304" pitchFamily="18" charset="0"/>
-                        <a:cs typeface="Times New Roman" panose="02020603050405020304" pitchFamily="18" charset="0"/>
-                      </a:endParaRPr>
-                    </a:p>
-                    <a:p>
-                      <a:pPr>
-                        <a:lnSpc>
-                          <a:spcPct val="107000"/>
-                        </a:lnSpc>
-                        <a:spcAft>
-                          <a:spcPts val="800"/>
-                        </a:spcAft>
-                        <a:buNone/>
-                      </a:pPr>
-                      <a:r>
                         <a:rPr lang="pt-BR" sz="2000" kern="100" dirty="0" err="1">
                           <a:effectLst/>
                           <a:latin typeface="Times New Roman" panose="02020603050405020304" pitchFamily="18" charset="0"/>
@@ -10379,14 +10204,189 @@
                         <a:buNone/>
                       </a:pPr>
                       <a:r>
-                        <a:rPr lang="pt-BR" sz="2000" kern="100">
+                        <a:rPr lang="pt-BR" sz="2000" kern="100" dirty="0">
                           <a:effectLst/>
                           <a:latin typeface="Times New Roman" panose="02020603050405020304" pitchFamily="18" charset="0"/>
                           <a:cs typeface="Times New Roman" panose="02020603050405020304" pitchFamily="18" charset="0"/>
                         </a:rPr>
                         <a:t>Poucas</a:t>
                       </a:r>
-                      <a:endParaRPr lang="pt-BR" sz="2000" kern="100">
+                      <a:endParaRPr lang="pt-BR" sz="2000" kern="100" dirty="0">
+                        <a:effectLst/>
+                        <a:latin typeface="Times New Roman" panose="02020603050405020304" pitchFamily="18" charset="0"/>
+                        <a:ea typeface="Aptos" panose="020B0004020202020204" pitchFamily="34" charset="0"/>
+                        <a:cs typeface="Times New Roman" panose="02020603050405020304" pitchFamily="18" charset="0"/>
+                      </a:endParaRPr>
+                    </a:p>
+                  </a:txBody>
+                  <a:tcPr marL="9525" marR="9525" marT="9525" marB="9525" anchor="ctr"/>
+                </a:tc>
+                <a:extLst>
+                  <a:ext uri="{0D108BD9-81ED-4DB2-BD59-A6C34878D82A}">
+                    <a16:rowId xmlns:a16="http://schemas.microsoft.com/office/drawing/2014/main" val="2382154496"/>
+                  </a:ext>
+                </a:extLst>
+              </a:tr>
+              <a:tr h="0">
+                <a:tc>
+                  <a:txBody>
+                    <a:bodyPr/>
+                    <a:lstStyle/>
+                    <a:p>
+                      <a:pPr>
+                        <a:lnSpc>
+                          <a:spcPct val="107000"/>
+                        </a:lnSpc>
+                        <a:spcAft>
+                          <a:spcPts val="800"/>
+                        </a:spcAft>
+                        <a:buNone/>
+                      </a:pPr>
+                      <a:endParaRPr lang="pt-BR" sz="2000" kern="100" dirty="0">
+                        <a:effectLst/>
+                        <a:latin typeface="Times New Roman" panose="02020603050405020304" pitchFamily="18" charset="0"/>
+                        <a:cs typeface="Times New Roman" panose="02020603050405020304" pitchFamily="18" charset="0"/>
+                      </a:endParaRPr>
+                    </a:p>
+                    <a:p>
+                      <a:pPr>
+                        <a:lnSpc>
+                          <a:spcPct val="107000"/>
+                        </a:lnSpc>
+                        <a:spcAft>
+                          <a:spcPts val="800"/>
+                        </a:spcAft>
+                        <a:buNone/>
+                      </a:pPr>
+                      <a:r>
+                        <a:rPr lang="pt-BR" sz="2000" kern="100" dirty="0">
+                          <a:effectLst/>
+                          <a:latin typeface="Times New Roman" panose="02020603050405020304" pitchFamily="18" charset="0"/>
+                          <a:cs typeface="Times New Roman" panose="02020603050405020304" pitchFamily="18" charset="0"/>
+                        </a:rPr>
+                        <a:t>Bubble </a:t>
+                      </a:r>
+                      <a:r>
+                        <a:rPr lang="pt-BR" sz="2000" kern="100" dirty="0" err="1">
+                          <a:effectLst/>
+                          <a:latin typeface="Times New Roman" panose="02020603050405020304" pitchFamily="18" charset="0"/>
+                          <a:cs typeface="Times New Roman" panose="02020603050405020304" pitchFamily="18" charset="0"/>
+                        </a:rPr>
+                        <a:t>Sort</a:t>
+                      </a:r>
+                      <a:endParaRPr lang="pt-BR" sz="2000" kern="100" dirty="0">
+                        <a:effectLst/>
+                        <a:latin typeface="Times New Roman" panose="02020603050405020304" pitchFamily="18" charset="0"/>
+                        <a:ea typeface="Aptos" panose="020B0004020202020204" pitchFamily="34" charset="0"/>
+                        <a:cs typeface="Times New Roman" panose="02020603050405020304" pitchFamily="18" charset="0"/>
+                      </a:endParaRPr>
+                    </a:p>
+                  </a:txBody>
+                  <a:tcPr marL="9525" marR="9525" marT="9525" marB="9525" anchor="ctr"/>
+                </a:tc>
+                <a:tc>
+                  <a:txBody>
+                    <a:bodyPr/>
+                    <a:lstStyle/>
+                    <a:p>
+                      <a:pPr algn="ctr">
+                        <a:lnSpc>
+                          <a:spcPct val="107000"/>
+                        </a:lnSpc>
+                        <a:spcAft>
+                          <a:spcPts val="800"/>
+                        </a:spcAft>
+                        <a:buNone/>
+                      </a:pPr>
+                      <a:r>
+                        <a:rPr lang="pt-BR" sz="2000" kern="100" dirty="0">
+                          <a:effectLst/>
+                          <a:latin typeface="Times New Roman" panose="02020603050405020304" pitchFamily="18" charset="0"/>
+                          <a:cs typeface="Times New Roman" panose="02020603050405020304" pitchFamily="18" charset="0"/>
+                        </a:rPr>
+                        <a:t>O(n</a:t>
+                      </a:r>
+                      <a:r>
+                        <a:rPr lang="pt-BR" sz="2000" kern="100" baseline="30000" dirty="0">
+                          <a:effectLst/>
+                          <a:latin typeface="Times New Roman" panose="02020603050405020304" pitchFamily="18" charset="0"/>
+                          <a:cs typeface="Times New Roman" panose="02020603050405020304" pitchFamily="18" charset="0"/>
+                        </a:rPr>
+                        <a:t>2</a:t>
+                      </a:r>
+                      <a:r>
+                        <a:rPr lang="pt-BR" sz="2000" kern="100" dirty="0">
+                          <a:effectLst/>
+                          <a:latin typeface="Times New Roman" panose="02020603050405020304" pitchFamily="18" charset="0"/>
+                          <a:cs typeface="Times New Roman" panose="02020603050405020304" pitchFamily="18" charset="0"/>
+                        </a:rPr>
+                        <a:t>)</a:t>
+                      </a:r>
+                      <a:endParaRPr lang="pt-BR" sz="2000" kern="100" dirty="0">
+                        <a:effectLst/>
+                        <a:latin typeface="Times New Roman" panose="02020603050405020304" pitchFamily="18" charset="0"/>
+                        <a:ea typeface="Aptos" panose="020B0004020202020204" pitchFamily="34" charset="0"/>
+                        <a:cs typeface="Times New Roman" panose="02020603050405020304" pitchFamily="18" charset="0"/>
+                      </a:endParaRPr>
+                    </a:p>
+                  </a:txBody>
+                  <a:tcPr marL="9525" marR="9525" marT="9525" marB="9525" anchor="ctr"/>
+                </a:tc>
+                <a:tc>
+                  <a:txBody>
+                    <a:bodyPr/>
+                    <a:lstStyle/>
+                    <a:p>
+                      <a:pPr algn="l">
+                        <a:lnSpc>
+                          <a:spcPct val="107000"/>
+                        </a:lnSpc>
+                        <a:spcAft>
+                          <a:spcPts val="800"/>
+                        </a:spcAft>
+                        <a:buNone/>
+                      </a:pPr>
+                      <a:r>
+                        <a:rPr lang="pt-BR" sz="2000" kern="100" dirty="0">
+                          <a:effectLst/>
+                          <a:latin typeface="Times New Roman" panose="02020603050405020304" pitchFamily="18" charset="0"/>
+                          <a:cs typeface="Times New Roman" panose="02020603050405020304" pitchFamily="18" charset="0"/>
+                        </a:rPr>
+                        <a:t>Aprendizado, simplicidade</a:t>
+                      </a:r>
+                      <a:endParaRPr lang="pt-BR" sz="2000" kern="100" dirty="0">
+                        <a:effectLst/>
+                        <a:latin typeface="Times New Roman" panose="02020603050405020304" pitchFamily="18" charset="0"/>
+                        <a:ea typeface="Aptos" panose="020B0004020202020204" pitchFamily="34" charset="0"/>
+                        <a:cs typeface="Times New Roman" panose="02020603050405020304" pitchFamily="18" charset="0"/>
+                      </a:endParaRPr>
+                    </a:p>
+                  </a:txBody>
+                  <a:tcPr marL="9525" marR="9525" marT="9525" marB="9525" anchor="ctr"/>
+                </a:tc>
+                <a:tc>
+                  <a:txBody>
+                    <a:bodyPr/>
+                    <a:lstStyle/>
+                    <a:p>
+                      <a:pPr algn="l">
+                        <a:lnSpc>
+                          <a:spcPct val="107000"/>
+                        </a:lnSpc>
+                        <a:spcAft>
+                          <a:spcPts val="800"/>
+                        </a:spcAft>
+                        <a:buNone/>
+                      </a:pPr>
+                      <a:r>
+                        <a:rPr lang="pt-BR" sz="2000" kern="100" dirty="0">
+                          <a:effectLst/>
+                          <a:latin typeface="Times New Roman" panose="02020603050405020304" pitchFamily="18" charset="0"/>
+                          <a:cs typeface="Times New Roman" panose="02020603050405020304" pitchFamily="18" charset="0"/>
+                        </a:rPr>
+                        <a:t>Muitas</a:t>
+                      </a:r>
+                      <a:endParaRPr lang="pt-BR" sz="2000" kern="100" dirty="0">
                         <a:effectLst/>
                         <a:latin typeface="Times New Roman" panose="02020603050405020304" pitchFamily="18" charset="0"/>
                         <a:ea typeface="Aptos" panose="020B0004020202020204" pitchFamily="34" charset="0"/>

</xml_diff>